<commit_message>
made corrections in ppt
</commit_message>
<xml_diff>
--- a/CTR_prediction.pptx
+++ b/CTR_prediction.pptx
@@ -171,7 +171,7 @@
           <a:noFill/>
           <a:extLst>
             <a:ext uri="{909E8E84-426E-40dd-AFC4-6F175D3DCCD1}">
-              <a14:hiddenFill xmlns:a14="http://schemas.microsoft.com/office/drawing/2010/main" xmlns="">
+              <a14:hiddenFill xmlns="" xmlns:a14="http://schemas.microsoft.com/office/drawing/2010/main">
                 <a:solidFill>
                   <a:srgbClr val="FFFFFF"/>
                 </a:solidFill>
@@ -230,7 +230,7 @@
             </a:ln>
             <a:extLst>
               <a:ext uri="{91240B29-F687-4f45-9708-019B960494DF}">
-                <a14:hiddenLine xmlns:a14="http://schemas.microsoft.com/office/drawing/2010/main" xmlns="" w="9525">
+                <a14:hiddenLine xmlns="" xmlns:a14="http://schemas.microsoft.com/office/drawing/2010/main" w="9525">
                   <a:solidFill>
                     <a:srgbClr val="000000"/>
                   </a:solidFill>
@@ -320,7 +320,7 @@
             </a:ln>
             <a:extLst>
               <a:ext uri="{91240B29-F687-4f45-9708-019B960494DF}">
-                <a14:hiddenLine xmlns:a14="http://schemas.microsoft.com/office/drawing/2010/main" xmlns="" w="9525">
+                <a14:hiddenLine xmlns="" xmlns:a14="http://schemas.microsoft.com/office/drawing/2010/main" w="9525">
                   <a:solidFill>
                     <a:srgbClr val="000000"/>
                   </a:solidFill>
@@ -410,7 +410,7 @@
             </a:ln>
             <a:extLst>
               <a:ext uri="{91240B29-F687-4f45-9708-019B960494DF}">
-                <a14:hiddenLine xmlns:a14="http://schemas.microsoft.com/office/drawing/2010/main" xmlns="" w="9525">
+                <a14:hiddenLine xmlns="" xmlns:a14="http://schemas.microsoft.com/office/drawing/2010/main" w="9525">
                   <a:solidFill>
                     <a:srgbClr val="000000"/>
                   </a:solidFill>
@@ -444,7 +444,7 @@
             </a:ln>
             <a:extLst>
               <a:ext uri="{91240B29-F687-4f45-9708-019B960494DF}">
-                <a14:hiddenLine xmlns:a14="http://schemas.microsoft.com/office/drawing/2010/main" xmlns="" w="9525">
+                <a14:hiddenLine xmlns="" xmlns:a14="http://schemas.microsoft.com/office/drawing/2010/main" w="9525">
                   <a:solidFill>
                     <a:srgbClr val="000000"/>
                   </a:solidFill>
@@ -534,7 +534,7 @@
             </a:ln>
             <a:extLst>
               <a:ext uri="{91240B29-F687-4f45-9708-019B960494DF}">
-                <a14:hiddenLine xmlns:a14="http://schemas.microsoft.com/office/drawing/2010/main" xmlns="" w="9525">
+                <a14:hiddenLine xmlns="" xmlns:a14="http://schemas.microsoft.com/office/drawing/2010/main" w="9525">
                   <a:solidFill>
                     <a:srgbClr val="000000"/>
                   </a:solidFill>
@@ -596,7 +596,7 @@
             </a:ln>
             <a:extLst>
               <a:ext uri="{91240B29-F687-4f45-9708-019B960494DF}">
-                <a14:hiddenLine xmlns:a14="http://schemas.microsoft.com/office/drawing/2010/main" xmlns="" w="9525">
+                <a14:hiddenLine xmlns="" xmlns:a14="http://schemas.microsoft.com/office/drawing/2010/main" w="9525">
                   <a:solidFill>
                     <a:srgbClr val="000000"/>
                   </a:solidFill>
@@ -658,7 +658,7 @@
             </a:ln>
             <a:extLst>
               <a:ext uri="{91240B29-F687-4f45-9708-019B960494DF}">
-                <a14:hiddenLine xmlns:a14="http://schemas.microsoft.com/office/drawing/2010/main" xmlns="" w="9525">
+                <a14:hiddenLine xmlns="" xmlns:a14="http://schemas.microsoft.com/office/drawing/2010/main" w="9525">
                   <a:solidFill>
                     <a:srgbClr val="000000"/>
                   </a:solidFill>
@@ -748,7 +748,7 @@
             </a:ln>
             <a:extLst>
               <a:ext uri="{91240B29-F687-4f45-9708-019B960494DF}">
-                <a14:hiddenLine xmlns:a14="http://schemas.microsoft.com/office/drawing/2010/main" xmlns="" w="9525">
+                <a14:hiddenLine xmlns="" xmlns:a14="http://schemas.microsoft.com/office/drawing/2010/main" w="9525">
                   <a:solidFill>
                     <a:srgbClr val="000000"/>
                   </a:solidFill>
@@ -810,7 +810,7 @@
             </a:ln>
             <a:extLst>
               <a:ext uri="{91240B29-F687-4f45-9708-019B960494DF}">
-                <a14:hiddenLine xmlns:a14="http://schemas.microsoft.com/office/drawing/2010/main" xmlns="" w="9525">
+                <a14:hiddenLine xmlns="" xmlns:a14="http://schemas.microsoft.com/office/drawing/2010/main" w="9525">
                   <a:solidFill>
                     <a:srgbClr val="000000"/>
                   </a:solidFill>
@@ -872,7 +872,7 @@
             </a:ln>
             <a:extLst>
               <a:ext uri="{91240B29-F687-4f45-9708-019B960494DF}">
-                <a14:hiddenLine xmlns:a14="http://schemas.microsoft.com/office/drawing/2010/main" xmlns="" w="9525">
+                <a14:hiddenLine xmlns="" xmlns:a14="http://schemas.microsoft.com/office/drawing/2010/main" w="9525">
                   <a:solidFill>
                     <a:srgbClr val="000000"/>
                   </a:solidFill>
@@ -962,7 +962,7 @@
             </a:ln>
             <a:extLst>
               <a:ext uri="{91240B29-F687-4f45-9708-019B960494DF}">
-                <a14:hiddenLine xmlns:a14="http://schemas.microsoft.com/office/drawing/2010/main" xmlns="" w="9525">
+                <a14:hiddenLine xmlns="" xmlns:a14="http://schemas.microsoft.com/office/drawing/2010/main" w="9525">
                   <a:solidFill>
                     <a:srgbClr val="000000"/>
                   </a:solidFill>
@@ -1052,7 +1052,7 @@
             </a:ln>
             <a:extLst>
               <a:ext uri="{91240B29-F687-4f45-9708-019B960494DF}">
-                <a14:hiddenLine xmlns:a14="http://schemas.microsoft.com/office/drawing/2010/main" xmlns="" w="9525">
+                <a14:hiddenLine xmlns="" xmlns:a14="http://schemas.microsoft.com/office/drawing/2010/main" w="9525">
                   <a:solidFill>
                     <a:srgbClr val="000000"/>
                   </a:solidFill>
@@ -1114,7 +1114,7 @@
             </a:ln>
             <a:extLst>
               <a:ext uri="{91240B29-F687-4f45-9708-019B960494DF}">
-                <a14:hiddenLine xmlns:a14="http://schemas.microsoft.com/office/drawing/2010/main" xmlns="" w="9525">
+                <a14:hiddenLine xmlns="" xmlns:a14="http://schemas.microsoft.com/office/drawing/2010/main" w="9525">
                   <a:solidFill>
                     <a:srgbClr val="000000"/>
                   </a:solidFill>
@@ -1224,7 +1224,7 @@
             </a:ln>
             <a:extLst>
               <a:ext uri="{91240B29-F687-4f45-9708-019B960494DF}">
-                <a14:hiddenLine xmlns:a14="http://schemas.microsoft.com/office/drawing/2010/main" xmlns="" w="9525">
+                <a14:hiddenLine xmlns="" xmlns:a14="http://schemas.microsoft.com/office/drawing/2010/main" w="9525">
                   <a:solidFill>
                     <a:srgbClr val="000000"/>
                   </a:solidFill>
@@ -1286,7 +1286,7 @@
             </a:ln>
             <a:extLst>
               <a:ext uri="{91240B29-F687-4f45-9708-019B960494DF}">
-                <a14:hiddenLine xmlns:a14="http://schemas.microsoft.com/office/drawing/2010/main" xmlns="" w="9525">
+                <a14:hiddenLine xmlns="" xmlns:a14="http://schemas.microsoft.com/office/drawing/2010/main" w="9525">
                   <a:solidFill>
                     <a:srgbClr val="000000"/>
                   </a:solidFill>
@@ -1376,7 +1376,7 @@
             </a:ln>
             <a:extLst>
               <a:ext uri="{91240B29-F687-4f45-9708-019B960494DF}">
-                <a14:hiddenLine xmlns:a14="http://schemas.microsoft.com/office/drawing/2010/main" xmlns="" w="9525">
+                <a14:hiddenLine xmlns="" xmlns:a14="http://schemas.microsoft.com/office/drawing/2010/main" w="9525">
                   <a:solidFill>
                     <a:srgbClr val="000000"/>
                   </a:solidFill>
@@ -1466,7 +1466,7 @@
             </a:ln>
             <a:extLst>
               <a:ext uri="{91240B29-F687-4f45-9708-019B960494DF}">
-                <a14:hiddenLine xmlns:a14="http://schemas.microsoft.com/office/drawing/2010/main" xmlns="" w="9525">
+                <a14:hiddenLine xmlns="" xmlns:a14="http://schemas.microsoft.com/office/drawing/2010/main" w="9525">
                   <a:solidFill>
                     <a:srgbClr val="000000"/>
                   </a:solidFill>
@@ -1528,7 +1528,7 @@
             </a:ln>
             <a:extLst>
               <a:ext uri="{91240B29-F687-4f45-9708-019B960494DF}">
-                <a14:hiddenLine xmlns:a14="http://schemas.microsoft.com/office/drawing/2010/main" xmlns="" w="9525">
+                <a14:hiddenLine xmlns="" xmlns:a14="http://schemas.microsoft.com/office/drawing/2010/main" w="9525">
                   <a:solidFill>
                     <a:srgbClr val="000000"/>
                   </a:solidFill>
@@ -1618,7 +1618,7 @@
             </a:ln>
             <a:extLst>
               <a:ext uri="{91240B29-F687-4f45-9708-019B960494DF}">
-                <a14:hiddenLine xmlns:a14="http://schemas.microsoft.com/office/drawing/2010/main" xmlns="" w="9525">
+                <a14:hiddenLine xmlns="" xmlns:a14="http://schemas.microsoft.com/office/drawing/2010/main" w="9525">
                   <a:solidFill>
                     <a:srgbClr val="000000"/>
                   </a:solidFill>
@@ -1708,7 +1708,7 @@
             </a:ln>
             <a:extLst>
               <a:ext uri="{91240B29-F687-4f45-9708-019B960494DF}">
-                <a14:hiddenLine xmlns:a14="http://schemas.microsoft.com/office/drawing/2010/main" xmlns="" w="9525">
+                <a14:hiddenLine xmlns="" xmlns:a14="http://schemas.microsoft.com/office/drawing/2010/main" w="9525">
                   <a:solidFill>
                     <a:srgbClr val="000000"/>
                   </a:solidFill>
@@ -1764,7 +1764,7 @@
             </a:ln>
             <a:extLst>
               <a:ext uri="{91240B29-F687-4f45-9708-019B960494DF}">
-                <a14:hiddenLine xmlns:a14="http://schemas.microsoft.com/office/drawing/2010/main" xmlns="" w="9525">
+                <a14:hiddenLine xmlns="" xmlns:a14="http://schemas.microsoft.com/office/drawing/2010/main" w="9525">
                   <a:solidFill>
                     <a:srgbClr val="000000"/>
                   </a:solidFill>
@@ -1854,7 +1854,7 @@
             </a:ln>
             <a:extLst>
               <a:ext uri="{91240B29-F687-4f45-9708-019B960494DF}">
-                <a14:hiddenLine xmlns:a14="http://schemas.microsoft.com/office/drawing/2010/main" xmlns="" w="9525">
+                <a14:hiddenLine xmlns="" xmlns:a14="http://schemas.microsoft.com/office/drawing/2010/main" w="9525">
                   <a:solidFill>
                     <a:srgbClr val="000000"/>
                   </a:solidFill>
@@ -1910,7 +1910,7 @@
             </a:ln>
             <a:extLst>
               <a:ext uri="{91240B29-F687-4f45-9708-019B960494DF}">
-                <a14:hiddenLine xmlns:a14="http://schemas.microsoft.com/office/drawing/2010/main" xmlns="" w="9525">
+                <a14:hiddenLine xmlns="" xmlns:a14="http://schemas.microsoft.com/office/drawing/2010/main" w="9525">
                   <a:solidFill>
                     <a:srgbClr val="000000"/>
                   </a:solidFill>
@@ -2000,7 +2000,7 @@
             </a:ln>
             <a:extLst>
               <a:ext uri="{91240B29-F687-4f45-9708-019B960494DF}">
-                <a14:hiddenLine xmlns:a14="http://schemas.microsoft.com/office/drawing/2010/main" xmlns="" w="9525">
+                <a14:hiddenLine xmlns="" xmlns:a14="http://schemas.microsoft.com/office/drawing/2010/main" w="9525">
                   <a:solidFill>
                     <a:srgbClr val="000000"/>
                   </a:solidFill>
@@ -2068,7 +2068,7 @@
             </a:ln>
             <a:extLst>
               <a:ext uri="{91240B29-F687-4f45-9708-019B960494DF}">
-                <a14:hiddenLine xmlns:a14="http://schemas.microsoft.com/office/drawing/2010/main" xmlns="" w="9525">
+                <a14:hiddenLine xmlns="" xmlns:a14="http://schemas.microsoft.com/office/drawing/2010/main" w="9525">
                   <a:solidFill>
                     <a:srgbClr val="000000"/>
                   </a:solidFill>
@@ -2158,7 +2158,7 @@
             </a:ln>
             <a:extLst>
               <a:ext uri="{91240B29-F687-4f45-9708-019B960494DF}">
-                <a14:hiddenLine xmlns:a14="http://schemas.microsoft.com/office/drawing/2010/main" xmlns="" w="9525">
+                <a14:hiddenLine xmlns="" xmlns:a14="http://schemas.microsoft.com/office/drawing/2010/main" w="9525">
                   <a:solidFill>
                     <a:srgbClr val="000000"/>
                   </a:solidFill>
@@ -2226,7 +2226,7 @@
             </a:ln>
             <a:extLst>
               <a:ext uri="{91240B29-F687-4f45-9708-019B960494DF}">
-                <a14:hiddenLine xmlns:a14="http://schemas.microsoft.com/office/drawing/2010/main" xmlns="" w="9525">
+                <a14:hiddenLine xmlns="" xmlns:a14="http://schemas.microsoft.com/office/drawing/2010/main" w="9525">
                   <a:solidFill>
                     <a:srgbClr val="000000"/>
                   </a:solidFill>
@@ -2316,7 +2316,7 @@
             </a:ln>
             <a:extLst>
               <a:ext uri="{91240B29-F687-4f45-9708-019B960494DF}">
-                <a14:hiddenLine xmlns:a14="http://schemas.microsoft.com/office/drawing/2010/main" xmlns="" w="9525">
+                <a14:hiddenLine xmlns="" xmlns:a14="http://schemas.microsoft.com/office/drawing/2010/main" w="9525">
                   <a:solidFill>
                     <a:srgbClr val="000000"/>
                   </a:solidFill>
@@ -2350,7 +2350,7 @@
             </a:ln>
             <a:extLst>
               <a:ext uri="{91240B29-F687-4f45-9708-019B960494DF}">
-                <a14:hiddenLine xmlns:a14="http://schemas.microsoft.com/office/drawing/2010/main" xmlns="" w="9525">
+                <a14:hiddenLine xmlns="" xmlns:a14="http://schemas.microsoft.com/office/drawing/2010/main" w="9525">
                   <a:solidFill>
                     <a:srgbClr val="000000"/>
                   </a:solidFill>
@@ -2440,7 +2440,7 @@
             </a:ln>
             <a:extLst>
               <a:ext uri="{91240B29-F687-4f45-9708-019B960494DF}">
-                <a14:hiddenLine xmlns:a14="http://schemas.microsoft.com/office/drawing/2010/main" xmlns="" w="9525">
+                <a14:hiddenLine xmlns="" xmlns:a14="http://schemas.microsoft.com/office/drawing/2010/main" w="9525">
                   <a:solidFill>
                     <a:srgbClr val="000000"/>
                   </a:solidFill>
@@ -2502,7 +2502,7 @@
             </a:ln>
             <a:extLst>
               <a:ext uri="{91240B29-F687-4f45-9708-019B960494DF}">
-                <a14:hiddenLine xmlns:a14="http://schemas.microsoft.com/office/drawing/2010/main" xmlns="" w="9525">
+                <a14:hiddenLine xmlns="" xmlns:a14="http://schemas.microsoft.com/office/drawing/2010/main" w="9525">
                   <a:solidFill>
                     <a:srgbClr val="000000"/>
                   </a:solidFill>
@@ -2564,7 +2564,7 @@
             </a:ln>
             <a:extLst>
               <a:ext uri="{91240B29-F687-4f45-9708-019B960494DF}">
-                <a14:hiddenLine xmlns:a14="http://schemas.microsoft.com/office/drawing/2010/main" xmlns="" w="9525">
+                <a14:hiddenLine xmlns="" xmlns:a14="http://schemas.microsoft.com/office/drawing/2010/main" w="9525">
                   <a:solidFill>
                     <a:srgbClr val="000000"/>
                   </a:solidFill>
@@ -2654,7 +2654,7 @@
             </a:ln>
             <a:extLst>
               <a:ext uri="{91240B29-F687-4f45-9708-019B960494DF}">
-                <a14:hiddenLine xmlns:a14="http://schemas.microsoft.com/office/drawing/2010/main" xmlns="" w="9525">
+                <a14:hiddenLine xmlns="" xmlns:a14="http://schemas.microsoft.com/office/drawing/2010/main" w="9525">
                   <a:solidFill>
                     <a:srgbClr val="000000"/>
                   </a:solidFill>
@@ -2722,7 +2722,7 @@
             </a:ln>
             <a:extLst>
               <a:ext uri="{91240B29-F687-4f45-9708-019B960494DF}">
-                <a14:hiddenLine xmlns:a14="http://schemas.microsoft.com/office/drawing/2010/main" xmlns="" w="9525">
+                <a14:hiddenLine xmlns="" xmlns:a14="http://schemas.microsoft.com/office/drawing/2010/main" w="9525">
                   <a:solidFill>
                     <a:srgbClr val="000000"/>
                   </a:solidFill>
@@ -2784,7 +2784,7 @@
             </a:ln>
             <a:extLst>
               <a:ext uri="{91240B29-F687-4f45-9708-019B960494DF}">
-                <a14:hiddenLine xmlns:a14="http://schemas.microsoft.com/office/drawing/2010/main" xmlns="" w="9525">
+                <a14:hiddenLine xmlns="" xmlns:a14="http://schemas.microsoft.com/office/drawing/2010/main" w="9525">
                   <a:solidFill>
                     <a:srgbClr val="000000"/>
                   </a:solidFill>
@@ -2874,7 +2874,7 @@
             </a:ln>
             <a:extLst>
               <a:ext uri="{91240B29-F687-4f45-9708-019B960494DF}">
-                <a14:hiddenLine xmlns:a14="http://schemas.microsoft.com/office/drawing/2010/main" xmlns="" w="9525">
+                <a14:hiddenLine xmlns="" xmlns:a14="http://schemas.microsoft.com/office/drawing/2010/main" w="9525">
                   <a:solidFill>
                     <a:srgbClr val="000000"/>
                   </a:solidFill>
@@ -2936,7 +2936,7 @@
             </a:ln>
             <a:extLst>
               <a:ext uri="{91240B29-F687-4f45-9708-019B960494DF}">
-                <a14:hiddenLine xmlns:a14="http://schemas.microsoft.com/office/drawing/2010/main" xmlns="" w="9525">
+                <a14:hiddenLine xmlns="" xmlns:a14="http://schemas.microsoft.com/office/drawing/2010/main" w="9525">
                   <a:solidFill>
                     <a:srgbClr val="000000"/>
                   </a:solidFill>
@@ -3026,7 +3026,7 @@
             </a:ln>
             <a:extLst>
               <a:ext uri="{91240B29-F687-4f45-9708-019B960494DF}">
-                <a14:hiddenLine xmlns:a14="http://schemas.microsoft.com/office/drawing/2010/main" xmlns="" w="9525">
+                <a14:hiddenLine xmlns="" xmlns:a14="http://schemas.microsoft.com/office/drawing/2010/main" w="9525">
                   <a:solidFill>
                     <a:srgbClr val="000000"/>
                   </a:solidFill>
@@ -3088,7 +3088,7 @@
             </a:ln>
             <a:extLst>
               <a:ext uri="{91240B29-F687-4f45-9708-019B960494DF}">
-                <a14:hiddenLine xmlns:a14="http://schemas.microsoft.com/office/drawing/2010/main" xmlns="" w="9525">
+                <a14:hiddenLine xmlns="" xmlns:a14="http://schemas.microsoft.com/office/drawing/2010/main" w="9525">
                   <a:solidFill>
                     <a:srgbClr val="000000"/>
                   </a:solidFill>
@@ -3178,7 +3178,7 @@
             </a:ln>
             <a:extLst>
               <a:ext uri="{91240B29-F687-4f45-9708-019B960494DF}">
-                <a14:hiddenLine xmlns:a14="http://schemas.microsoft.com/office/drawing/2010/main" xmlns="" w="9525">
+                <a14:hiddenLine xmlns="" xmlns:a14="http://schemas.microsoft.com/office/drawing/2010/main" w="9525">
                   <a:solidFill>
                     <a:srgbClr val="000000"/>
                   </a:solidFill>
@@ -3212,7 +3212,7 @@
             </a:ln>
             <a:extLst>
               <a:ext uri="{91240B29-F687-4f45-9708-019B960494DF}">
-                <a14:hiddenLine xmlns:a14="http://schemas.microsoft.com/office/drawing/2010/main" xmlns="" w="9525">
+                <a14:hiddenLine xmlns="" xmlns:a14="http://schemas.microsoft.com/office/drawing/2010/main" w="9525">
                   <a:solidFill>
                     <a:srgbClr val="000000"/>
                   </a:solidFill>
@@ -3277,7 +3277,7 @@
             </a:ln>
             <a:extLst>
               <a:ext uri="{91240B29-F687-4f45-9708-019B960494DF}">
-                <a14:hiddenLine xmlns:a14="http://schemas.microsoft.com/office/drawing/2010/main" xmlns="" w="9525">
+                <a14:hiddenLine xmlns="" xmlns:a14="http://schemas.microsoft.com/office/drawing/2010/main" w="9525">
                   <a:solidFill>
                     <a:srgbClr val="000000"/>
                   </a:solidFill>
@@ -3367,7 +3367,7 @@
             </a:ln>
             <a:extLst>
               <a:ext uri="{91240B29-F687-4f45-9708-019B960494DF}">
-                <a14:hiddenLine xmlns:a14="http://schemas.microsoft.com/office/drawing/2010/main" xmlns="" w="9525">
+                <a14:hiddenLine xmlns="" xmlns:a14="http://schemas.microsoft.com/office/drawing/2010/main" w="9525">
                   <a:solidFill>
                     <a:srgbClr val="000000"/>
                   </a:solidFill>
@@ -3429,7 +3429,7 @@
             </a:ln>
             <a:extLst>
               <a:ext uri="{91240B29-F687-4f45-9708-019B960494DF}">
-                <a14:hiddenLine xmlns:a14="http://schemas.microsoft.com/office/drawing/2010/main" xmlns="" w="9525">
+                <a14:hiddenLine xmlns="" xmlns:a14="http://schemas.microsoft.com/office/drawing/2010/main" w="9525">
                   <a:solidFill>
                     <a:srgbClr val="000000"/>
                   </a:solidFill>
@@ -3519,7 +3519,7 @@
             </a:ln>
             <a:extLst>
               <a:ext uri="{91240B29-F687-4f45-9708-019B960494DF}">
-                <a14:hiddenLine xmlns:a14="http://schemas.microsoft.com/office/drawing/2010/main" xmlns="" w="9525">
+                <a14:hiddenLine xmlns="" xmlns:a14="http://schemas.microsoft.com/office/drawing/2010/main" w="9525">
                   <a:solidFill>
                     <a:srgbClr val="000000"/>
                   </a:solidFill>
@@ -3609,7 +3609,7 @@
             </a:ln>
             <a:extLst>
               <a:ext uri="{91240B29-F687-4f45-9708-019B960494DF}">
-                <a14:hiddenLine xmlns:a14="http://schemas.microsoft.com/office/drawing/2010/main" xmlns="" w="9525">
+                <a14:hiddenLine xmlns="" xmlns:a14="http://schemas.microsoft.com/office/drawing/2010/main" w="9525">
                   <a:solidFill>
                     <a:srgbClr val="000000"/>
                   </a:solidFill>
@@ -3674,7 +3674,7 @@
             </a:ln>
             <a:extLst>
               <a:ext uri="{91240B29-F687-4f45-9708-019B960494DF}">
-                <a14:hiddenLine xmlns:a14="http://schemas.microsoft.com/office/drawing/2010/main" xmlns="" w="9525">
+                <a14:hiddenLine xmlns="" xmlns:a14="http://schemas.microsoft.com/office/drawing/2010/main" w="9525">
                   <a:solidFill>
                     <a:srgbClr val="000000"/>
                   </a:solidFill>
@@ -3736,7 +3736,7 @@
             </a:ln>
             <a:extLst>
               <a:ext uri="{91240B29-F687-4f45-9708-019B960494DF}">
-                <a14:hiddenLine xmlns:a14="http://schemas.microsoft.com/office/drawing/2010/main" xmlns="" w="9525">
+                <a14:hiddenLine xmlns="" xmlns:a14="http://schemas.microsoft.com/office/drawing/2010/main" w="9525">
                   <a:solidFill>
                     <a:srgbClr val="000000"/>
                   </a:solidFill>
@@ -3826,7 +3826,7 @@
             </a:ln>
             <a:extLst>
               <a:ext uri="{91240B29-F687-4f45-9708-019B960494DF}">
-                <a14:hiddenLine xmlns:a14="http://schemas.microsoft.com/office/drawing/2010/main" xmlns="" w="9525">
+                <a14:hiddenLine xmlns="" xmlns:a14="http://schemas.microsoft.com/office/drawing/2010/main" w="9525">
                   <a:solidFill>
                     <a:srgbClr val="000000"/>
                   </a:solidFill>
@@ -3916,7 +3916,7 @@
             </a:ln>
             <a:extLst>
               <a:ext uri="{91240B29-F687-4f45-9708-019B960494DF}">
-                <a14:hiddenLine xmlns:a14="http://schemas.microsoft.com/office/drawing/2010/main" xmlns="" w="9525">
+                <a14:hiddenLine xmlns="" xmlns:a14="http://schemas.microsoft.com/office/drawing/2010/main" w="9525">
                   <a:solidFill>
                     <a:srgbClr val="000000"/>
                   </a:solidFill>
@@ -3978,7 +3978,7 @@
             </a:ln>
             <a:extLst>
               <a:ext uri="{91240B29-F687-4f45-9708-019B960494DF}">
-                <a14:hiddenLine xmlns:a14="http://schemas.microsoft.com/office/drawing/2010/main" xmlns="" w="9525">
+                <a14:hiddenLine xmlns="" xmlns:a14="http://schemas.microsoft.com/office/drawing/2010/main" w="9525">
                   <a:solidFill>
                     <a:srgbClr val="000000"/>
                   </a:solidFill>
@@ -4098,7 +4098,7 @@
             </a:ln>
             <a:extLst>
               <a:ext uri="{91240B29-F687-4f45-9708-019B960494DF}">
-                <a14:hiddenLine xmlns:a14="http://schemas.microsoft.com/office/drawing/2010/main" xmlns="" w="9525">
+                <a14:hiddenLine xmlns="" xmlns:a14="http://schemas.microsoft.com/office/drawing/2010/main" w="9525">
                   <a:solidFill>
                     <a:srgbClr val="000000"/>
                   </a:solidFill>
@@ -4166,7 +4166,7 @@
             </a:ln>
             <a:extLst>
               <a:ext uri="{91240B29-F687-4f45-9708-019B960494DF}">
-                <a14:hiddenLine xmlns:a14="http://schemas.microsoft.com/office/drawing/2010/main" xmlns="" w="9525">
+                <a14:hiddenLine xmlns="" xmlns:a14="http://schemas.microsoft.com/office/drawing/2010/main" w="9525">
                   <a:solidFill>
                     <a:srgbClr val="000000"/>
                   </a:solidFill>
@@ -4256,7 +4256,7 @@
             </a:ln>
             <a:extLst>
               <a:ext uri="{91240B29-F687-4f45-9708-019B960494DF}">
-                <a14:hiddenLine xmlns:a14="http://schemas.microsoft.com/office/drawing/2010/main" xmlns="" w="9525">
+                <a14:hiddenLine xmlns="" xmlns:a14="http://schemas.microsoft.com/office/drawing/2010/main" w="9525">
                   <a:solidFill>
                     <a:srgbClr val="000000"/>
                   </a:solidFill>
@@ -9070,7 +9070,7 @@
           <a:noFill/>
           <a:extLst>
             <a:ext uri="{909E8E84-426E-40dd-AFC4-6F175D3DCCD1}">
-              <a14:hiddenFill xmlns:a14="http://schemas.microsoft.com/office/drawing/2010/main" xmlns="">
+              <a14:hiddenFill xmlns="" xmlns:a14="http://schemas.microsoft.com/office/drawing/2010/main">
                 <a:solidFill>
                   <a:srgbClr val="FFFFFF"/>
                 </a:solidFill>
@@ -9144,7 +9144,7 @@
               </a:ln>
               <a:extLst>
                 <a:ext uri="{91240B29-F687-4f45-9708-019B960494DF}">
-                  <a14:hiddenLine xmlns:a14="http://schemas.microsoft.com/office/drawing/2010/main" xmlns="" w="9525">
+                  <a14:hiddenLine xmlns="" xmlns:a14="http://schemas.microsoft.com/office/drawing/2010/main" w="9525">
                     <a:solidFill>
                       <a:srgbClr val="000000"/>
                     </a:solidFill>
@@ -9234,7 +9234,7 @@
               </a:ln>
               <a:extLst>
                 <a:ext uri="{91240B29-F687-4f45-9708-019B960494DF}">
-                  <a14:hiddenLine xmlns:a14="http://schemas.microsoft.com/office/drawing/2010/main" xmlns="" w="9525">
+                  <a14:hiddenLine xmlns="" xmlns:a14="http://schemas.microsoft.com/office/drawing/2010/main" w="9525">
                     <a:solidFill>
                       <a:srgbClr val="000000"/>
                     </a:solidFill>
@@ -9324,7 +9324,7 @@
               </a:ln>
               <a:extLst>
                 <a:ext uri="{91240B29-F687-4f45-9708-019B960494DF}">
-                  <a14:hiddenLine xmlns:a14="http://schemas.microsoft.com/office/drawing/2010/main" xmlns="" w="9525">
+                  <a14:hiddenLine xmlns="" xmlns:a14="http://schemas.microsoft.com/office/drawing/2010/main" w="9525">
                     <a:solidFill>
                       <a:srgbClr val="000000"/>
                     </a:solidFill>
@@ -9386,7 +9386,7 @@
               </a:ln>
               <a:extLst>
                 <a:ext uri="{91240B29-F687-4f45-9708-019B960494DF}">
-                  <a14:hiddenLine xmlns:a14="http://schemas.microsoft.com/office/drawing/2010/main" xmlns="" w="9525">
+                  <a14:hiddenLine xmlns="" xmlns:a14="http://schemas.microsoft.com/office/drawing/2010/main" w="9525">
                     <a:solidFill>
                       <a:srgbClr val="000000"/>
                     </a:solidFill>
@@ -9476,7 +9476,7 @@
               </a:ln>
               <a:extLst>
                 <a:ext uri="{91240B29-F687-4f45-9708-019B960494DF}">
-                  <a14:hiddenLine xmlns:a14="http://schemas.microsoft.com/office/drawing/2010/main" xmlns="" w="9525">
+                  <a14:hiddenLine xmlns="" xmlns:a14="http://schemas.microsoft.com/office/drawing/2010/main" w="9525">
                     <a:solidFill>
                       <a:srgbClr val="000000"/>
                     </a:solidFill>
@@ -9538,7 +9538,7 @@
               </a:ln>
               <a:extLst>
                 <a:ext uri="{91240B29-F687-4f45-9708-019B960494DF}">
-                  <a14:hiddenLine xmlns:a14="http://schemas.microsoft.com/office/drawing/2010/main" xmlns="" w="9525">
+                  <a14:hiddenLine xmlns="" xmlns:a14="http://schemas.microsoft.com/office/drawing/2010/main" w="9525">
                     <a:solidFill>
                       <a:srgbClr val="000000"/>
                     </a:solidFill>
@@ -9600,7 +9600,7 @@
               </a:ln>
               <a:extLst>
                 <a:ext uri="{91240B29-F687-4f45-9708-019B960494DF}">
-                  <a14:hiddenLine xmlns:a14="http://schemas.microsoft.com/office/drawing/2010/main" xmlns="" w="9525">
+                  <a14:hiddenLine xmlns="" xmlns:a14="http://schemas.microsoft.com/office/drawing/2010/main" w="9525">
                     <a:solidFill>
                       <a:srgbClr val="000000"/>
                     </a:solidFill>
@@ -9690,7 +9690,7 @@
               </a:ln>
               <a:extLst>
                 <a:ext uri="{91240B29-F687-4f45-9708-019B960494DF}">
-                  <a14:hiddenLine xmlns:a14="http://schemas.microsoft.com/office/drawing/2010/main" xmlns="" w="9525">
+                  <a14:hiddenLine xmlns="" xmlns:a14="http://schemas.microsoft.com/office/drawing/2010/main" w="9525">
                     <a:solidFill>
                       <a:srgbClr val="000000"/>
                     </a:solidFill>
@@ -9780,7 +9780,7 @@
               </a:ln>
               <a:extLst>
                 <a:ext uri="{91240B29-F687-4f45-9708-019B960494DF}">
-                  <a14:hiddenLine xmlns:a14="http://schemas.microsoft.com/office/drawing/2010/main" xmlns="" w="9525">
+                  <a14:hiddenLine xmlns="" xmlns:a14="http://schemas.microsoft.com/office/drawing/2010/main" w="9525">
                     <a:solidFill>
                       <a:srgbClr val="000000"/>
                     </a:solidFill>
@@ -9842,7 +9842,7 @@
               </a:ln>
               <a:extLst>
                 <a:ext uri="{91240B29-F687-4f45-9708-019B960494DF}">
-                  <a14:hiddenLine xmlns:a14="http://schemas.microsoft.com/office/drawing/2010/main" xmlns="" w="9525">
+                  <a14:hiddenLine xmlns="" xmlns:a14="http://schemas.microsoft.com/office/drawing/2010/main" w="9525">
                     <a:solidFill>
                       <a:srgbClr val="000000"/>
                     </a:solidFill>
@@ -9952,7 +9952,7 @@
               </a:ln>
               <a:extLst>
                 <a:ext uri="{91240B29-F687-4f45-9708-019B960494DF}">
-                  <a14:hiddenLine xmlns:a14="http://schemas.microsoft.com/office/drawing/2010/main" xmlns="" w="9525">
+                  <a14:hiddenLine xmlns="" xmlns:a14="http://schemas.microsoft.com/office/drawing/2010/main" w="9525">
                     <a:solidFill>
                       <a:srgbClr val="000000"/>
                     </a:solidFill>
@@ -10036,7 +10036,7 @@
               </a:ln>
               <a:extLst>
                 <a:ext uri="{91240B29-F687-4f45-9708-019B960494DF}">
-                  <a14:hiddenLine xmlns:a14="http://schemas.microsoft.com/office/drawing/2010/main" xmlns="" w="9525">
+                  <a14:hiddenLine xmlns="" xmlns:a14="http://schemas.microsoft.com/office/drawing/2010/main" w="9525">
                     <a:solidFill>
                       <a:srgbClr val="000000"/>
                     </a:solidFill>
@@ -10098,7 +10098,7 @@
               </a:ln>
               <a:extLst>
                 <a:ext uri="{91240B29-F687-4f45-9708-019B960494DF}">
-                  <a14:hiddenLine xmlns:a14="http://schemas.microsoft.com/office/drawing/2010/main" xmlns="" w="9525">
+                  <a14:hiddenLine xmlns="" xmlns:a14="http://schemas.microsoft.com/office/drawing/2010/main" w="9525">
                     <a:solidFill>
                       <a:srgbClr val="000000"/>
                     </a:solidFill>
@@ -10160,7 +10160,7 @@
               </a:ln>
               <a:extLst>
                 <a:ext uri="{91240B29-F687-4f45-9708-019B960494DF}">
-                  <a14:hiddenLine xmlns:a14="http://schemas.microsoft.com/office/drawing/2010/main" xmlns="" w="9525">
+                  <a14:hiddenLine xmlns="" xmlns:a14="http://schemas.microsoft.com/office/drawing/2010/main" w="9525">
                     <a:solidFill>
                       <a:srgbClr val="000000"/>
                     </a:solidFill>
@@ -10250,7 +10250,7 @@
               </a:ln>
               <a:extLst>
                 <a:ext uri="{91240B29-F687-4f45-9708-019B960494DF}">
-                  <a14:hiddenLine xmlns:a14="http://schemas.microsoft.com/office/drawing/2010/main" xmlns="" w="9525">
+                  <a14:hiddenLine xmlns="" xmlns:a14="http://schemas.microsoft.com/office/drawing/2010/main" w="9525">
                     <a:solidFill>
                       <a:srgbClr val="000000"/>
                     </a:solidFill>
@@ -10284,7 +10284,7 @@
               </a:ln>
               <a:extLst>
                 <a:ext uri="{91240B29-F687-4f45-9708-019B960494DF}">
-                  <a14:hiddenLine xmlns:a14="http://schemas.microsoft.com/office/drawing/2010/main" xmlns="" w="9525">
+                  <a14:hiddenLine xmlns="" xmlns:a14="http://schemas.microsoft.com/office/drawing/2010/main" w="9525">
                     <a:solidFill>
                       <a:srgbClr val="000000"/>
                     </a:solidFill>
@@ -10349,7 +10349,7 @@
               </a:ln>
               <a:extLst>
                 <a:ext uri="{91240B29-F687-4f45-9708-019B960494DF}">
-                  <a14:hiddenLine xmlns:a14="http://schemas.microsoft.com/office/drawing/2010/main" xmlns="" w="9525">
+                  <a14:hiddenLine xmlns="" xmlns:a14="http://schemas.microsoft.com/office/drawing/2010/main" w="9525">
                     <a:solidFill>
                       <a:srgbClr val="000000"/>
                     </a:solidFill>
@@ -10439,7 +10439,7 @@
               </a:ln>
               <a:extLst>
                 <a:ext uri="{91240B29-F687-4f45-9708-019B960494DF}">
-                  <a14:hiddenLine xmlns:a14="http://schemas.microsoft.com/office/drawing/2010/main" xmlns="" w="9525">
+                  <a14:hiddenLine xmlns="" xmlns:a14="http://schemas.microsoft.com/office/drawing/2010/main" w="9525">
                     <a:solidFill>
                       <a:srgbClr val="000000"/>
                     </a:solidFill>
@@ -10501,7 +10501,7 @@
               </a:ln>
               <a:extLst>
                 <a:ext uri="{91240B29-F687-4f45-9708-019B960494DF}">
-                  <a14:hiddenLine xmlns:a14="http://schemas.microsoft.com/office/drawing/2010/main" xmlns="" w="9525">
+                  <a14:hiddenLine xmlns="" xmlns:a14="http://schemas.microsoft.com/office/drawing/2010/main" w="9525">
                     <a:solidFill>
                       <a:srgbClr val="000000"/>
                     </a:solidFill>
@@ -10591,7 +10591,7 @@
               </a:ln>
               <a:extLst>
                 <a:ext uri="{91240B29-F687-4f45-9708-019B960494DF}">
-                  <a14:hiddenLine xmlns:a14="http://schemas.microsoft.com/office/drawing/2010/main" xmlns="" w="9525">
+                  <a14:hiddenLine xmlns="" xmlns:a14="http://schemas.microsoft.com/office/drawing/2010/main" w="9525">
                     <a:solidFill>
                       <a:srgbClr val="000000"/>
                     </a:solidFill>
@@ -10656,7 +10656,7 @@
               </a:ln>
               <a:extLst>
                 <a:ext uri="{91240B29-F687-4f45-9708-019B960494DF}">
-                  <a14:hiddenLine xmlns:a14="http://schemas.microsoft.com/office/drawing/2010/main" xmlns="" w="9525">
+                  <a14:hiddenLine xmlns="" xmlns:a14="http://schemas.microsoft.com/office/drawing/2010/main" w="9525">
                     <a:solidFill>
                       <a:srgbClr val="000000"/>
                     </a:solidFill>
@@ -10718,7 +10718,7 @@
               </a:ln>
               <a:extLst>
                 <a:ext uri="{91240B29-F687-4f45-9708-019B960494DF}">
-                  <a14:hiddenLine xmlns:a14="http://schemas.microsoft.com/office/drawing/2010/main" xmlns="" w="9525">
+                  <a14:hiddenLine xmlns="" xmlns:a14="http://schemas.microsoft.com/office/drawing/2010/main" w="9525">
                     <a:solidFill>
                       <a:srgbClr val="000000"/>
                     </a:solidFill>
@@ -10808,7 +10808,7 @@
               </a:ln>
               <a:extLst>
                 <a:ext uri="{91240B29-F687-4f45-9708-019B960494DF}">
-                  <a14:hiddenLine xmlns:a14="http://schemas.microsoft.com/office/drawing/2010/main" xmlns="" w="9525">
+                  <a14:hiddenLine xmlns="" xmlns:a14="http://schemas.microsoft.com/office/drawing/2010/main" w="9525">
                     <a:solidFill>
                       <a:srgbClr val="000000"/>
                     </a:solidFill>
@@ -10898,7 +10898,7 @@
               </a:ln>
               <a:extLst>
                 <a:ext uri="{91240B29-F687-4f45-9708-019B960494DF}">
-                  <a14:hiddenLine xmlns:a14="http://schemas.microsoft.com/office/drawing/2010/main" xmlns="" w="9525">
+                  <a14:hiddenLine xmlns="" xmlns:a14="http://schemas.microsoft.com/office/drawing/2010/main" w="9525">
                     <a:solidFill>
                       <a:srgbClr val="000000"/>
                     </a:solidFill>
@@ -10963,7 +10963,7 @@
               </a:ln>
               <a:extLst>
                 <a:ext uri="{91240B29-F687-4f45-9708-019B960494DF}">
-                  <a14:hiddenLine xmlns:a14="http://schemas.microsoft.com/office/drawing/2010/main" xmlns="" w="9525">
+                  <a14:hiddenLine xmlns="" xmlns:a14="http://schemas.microsoft.com/office/drawing/2010/main" w="9525">
                     <a:solidFill>
                       <a:srgbClr val="000000"/>
                     </a:solidFill>
@@ -11083,7 +11083,7 @@
               </a:ln>
               <a:extLst>
                 <a:ext uri="{91240B29-F687-4f45-9708-019B960494DF}">
-                  <a14:hiddenLine xmlns:a14="http://schemas.microsoft.com/office/drawing/2010/main" xmlns="" w="9525">
+                  <a14:hiddenLine xmlns="" xmlns:a14="http://schemas.microsoft.com/office/drawing/2010/main" w="9525">
                     <a:solidFill>
                       <a:srgbClr val="000000"/>
                     </a:solidFill>
@@ -11164,7 +11164,7 @@
               </a:ln>
               <a:extLst>
                 <a:ext uri="{91240B29-F687-4f45-9708-019B960494DF}">
-                  <a14:hiddenLine xmlns:a14="http://schemas.microsoft.com/office/drawing/2010/main" xmlns="" w="9525">
+                  <a14:hiddenLine xmlns="" xmlns:a14="http://schemas.microsoft.com/office/drawing/2010/main" w="9525">
                     <a:solidFill>
                       <a:srgbClr val="000000"/>
                     </a:solidFill>
@@ -11279,7 +11279,7 @@
               </a:ln>
               <a:extLst>
                 <a:ext uri="{91240B29-F687-4f45-9708-019B960494DF}">
-                  <a14:hiddenLine xmlns:a14="http://schemas.microsoft.com/office/drawing/2010/main" xmlns="" w="9525">
+                  <a14:hiddenLine xmlns="" xmlns:a14="http://schemas.microsoft.com/office/drawing/2010/main" w="9525">
                     <a:solidFill>
                       <a:srgbClr val="000000"/>
                     </a:solidFill>
@@ -11369,7 +11369,7 @@
               </a:ln>
               <a:extLst>
                 <a:ext uri="{91240B29-F687-4f45-9708-019B960494DF}">
-                  <a14:hiddenLine xmlns:a14="http://schemas.microsoft.com/office/drawing/2010/main" xmlns="" w="9525">
+                  <a14:hiddenLine xmlns="" xmlns:a14="http://schemas.microsoft.com/office/drawing/2010/main" w="9525">
                     <a:solidFill>
                       <a:srgbClr val="000000"/>
                     </a:solidFill>
@@ -11434,7 +11434,7 @@
               </a:ln>
               <a:extLst>
                 <a:ext uri="{91240B29-F687-4f45-9708-019B960494DF}">
-                  <a14:hiddenLine xmlns:a14="http://schemas.microsoft.com/office/drawing/2010/main" xmlns="" w="9525">
+                  <a14:hiddenLine xmlns="" xmlns:a14="http://schemas.microsoft.com/office/drawing/2010/main" w="9525">
                     <a:solidFill>
                       <a:srgbClr val="000000"/>
                     </a:solidFill>
@@ -11524,7 +11524,7 @@
               </a:ln>
               <a:extLst>
                 <a:ext uri="{91240B29-F687-4f45-9708-019B960494DF}">
-                  <a14:hiddenLine xmlns:a14="http://schemas.microsoft.com/office/drawing/2010/main" xmlns="" w="9525">
+                  <a14:hiddenLine xmlns="" xmlns:a14="http://schemas.microsoft.com/office/drawing/2010/main" w="9525">
                     <a:solidFill>
                       <a:srgbClr val="000000"/>
                     </a:solidFill>
@@ -11592,7 +11592,7 @@
               </a:ln>
               <a:extLst>
                 <a:ext uri="{91240B29-F687-4f45-9708-019B960494DF}">
-                  <a14:hiddenLine xmlns:a14="http://schemas.microsoft.com/office/drawing/2010/main" xmlns="" w="9525">
+                  <a14:hiddenLine xmlns="" xmlns:a14="http://schemas.microsoft.com/office/drawing/2010/main" w="9525">
                     <a:solidFill>
                       <a:srgbClr val="000000"/>
                     </a:solidFill>
@@ -11682,7 +11682,7 @@
               </a:ln>
               <a:extLst>
                 <a:ext uri="{91240B29-F687-4f45-9708-019B960494DF}">
-                  <a14:hiddenLine xmlns:a14="http://schemas.microsoft.com/office/drawing/2010/main" xmlns="" w="9525">
+                  <a14:hiddenLine xmlns="" xmlns:a14="http://schemas.microsoft.com/office/drawing/2010/main" w="9525">
                     <a:solidFill>
                       <a:srgbClr val="000000"/>
                     </a:solidFill>
@@ -11750,7 +11750,7 @@
               </a:ln>
               <a:extLst>
                 <a:ext uri="{91240B29-F687-4f45-9708-019B960494DF}">
-                  <a14:hiddenLine xmlns:a14="http://schemas.microsoft.com/office/drawing/2010/main" xmlns="" w="9525">
+                  <a14:hiddenLine xmlns="" xmlns:a14="http://schemas.microsoft.com/office/drawing/2010/main" w="9525">
                     <a:solidFill>
                       <a:srgbClr val="000000"/>
                     </a:solidFill>
@@ -11840,7 +11840,7 @@
               </a:ln>
               <a:extLst>
                 <a:ext uri="{91240B29-F687-4f45-9708-019B960494DF}">
-                  <a14:hiddenLine xmlns:a14="http://schemas.microsoft.com/office/drawing/2010/main" xmlns="" w="9525">
+                  <a14:hiddenLine xmlns="" xmlns:a14="http://schemas.microsoft.com/office/drawing/2010/main" w="9525">
                     <a:solidFill>
                       <a:srgbClr val="000000"/>
                     </a:solidFill>
@@ -11874,7 +11874,7 @@
               </a:ln>
               <a:extLst>
                 <a:ext uri="{91240B29-F687-4f45-9708-019B960494DF}">
-                  <a14:hiddenLine xmlns:a14="http://schemas.microsoft.com/office/drawing/2010/main" xmlns="" w="9525">
+                  <a14:hiddenLine xmlns="" xmlns:a14="http://schemas.microsoft.com/office/drawing/2010/main" w="9525">
                     <a:solidFill>
                       <a:srgbClr val="000000"/>
                     </a:solidFill>
@@ -12670,7 +12670,7 @@
             </a:ln>
             <a:extLst>
               <a:ext uri="{91240B29-F687-4f45-9708-019B960494DF}">
-                <a14:hiddenLine xmlns="" xmlns:a16="http://schemas.microsoft.com/office/drawing/2014/main" xmlns:p14="http://schemas.microsoft.com/office/powerpoint/2010/main" xmlns:a14="http://schemas.microsoft.com/office/drawing/2010/main" w="9525">
+                <a14:hiddenLine xmlns:a14="http://schemas.microsoft.com/office/drawing/2010/main" xmlns:p14="http://schemas.microsoft.com/office/powerpoint/2010/main" xmlns:a16="http://schemas.microsoft.com/office/drawing/2014/main" xmlns="" w="9525">
                   <a:solidFill>
                     <a:srgbClr val="000000"/>
                   </a:solidFill>
@@ -12775,7 +12775,7 @@
             </a:ln>
             <a:extLst>
               <a:ext uri="{91240B29-F687-4f45-9708-019B960494DF}">
-                <a14:hiddenLine xmlns="" xmlns:a16="http://schemas.microsoft.com/office/drawing/2014/main" xmlns:p14="http://schemas.microsoft.com/office/powerpoint/2010/main" xmlns:a14="http://schemas.microsoft.com/office/drawing/2010/main" w="9525">
+                <a14:hiddenLine xmlns:a14="http://schemas.microsoft.com/office/drawing/2010/main" xmlns:p14="http://schemas.microsoft.com/office/powerpoint/2010/main" xmlns:a16="http://schemas.microsoft.com/office/drawing/2014/main" xmlns="" w="9525">
                   <a:solidFill>
                     <a:srgbClr val="000000"/>
                   </a:solidFill>
@@ -12880,7 +12880,7 @@
             </a:ln>
             <a:extLst>
               <a:ext uri="{91240B29-F687-4f45-9708-019B960494DF}">
-                <a14:hiddenLine xmlns="" xmlns:a16="http://schemas.microsoft.com/office/drawing/2014/main" xmlns:p14="http://schemas.microsoft.com/office/powerpoint/2010/main" xmlns:a14="http://schemas.microsoft.com/office/drawing/2010/main" w="9525">
+                <a14:hiddenLine xmlns:a14="http://schemas.microsoft.com/office/drawing/2010/main" xmlns:p14="http://schemas.microsoft.com/office/powerpoint/2010/main" xmlns:a16="http://schemas.microsoft.com/office/drawing/2014/main" xmlns="" w="9525">
                   <a:solidFill>
                     <a:srgbClr val="000000"/>
                   </a:solidFill>
@@ -12957,7 +12957,7 @@
             </a:ln>
             <a:extLst>
               <a:ext uri="{91240B29-F687-4f45-9708-019B960494DF}">
-                <a14:hiddenLine xmlns="" xmlns:a16="http://schemas.microsoft.com/office/drawing/2014/main" xmlns:p14="http://schemas.microsoft.com/office/powerpoint/2010/main" xmlns:a14="http://schemas.microsoft.com/office/drawing/2010/main" w="9525">
+                <a14:hiddenLine xmlns:a14="http://schemas.microsoft.com/office/drawing/2010/main" xmlns:p14="http://schemas.microsoft.com/office/powerpoint/2010/main" xmlns:a16="http://schemas.microsoft.com/office/drawing/2014/main" xmlns="" w="9525">
                   <a:solidFill>
                     <a:srgbClr val="000000"/>
                   </a:solidFill>
@@ -13062,7 +13062,7 @@
             </a:ln>
             <a:extLst>
               <a:ext uri="{91240B29-F687-4f45-9708-019B960494DF}">
-                <a14:hiddenLine xmlns="" xmlns:a16="http://schemas.microsoft.com/office/drawing/2014/main" xmlns:p14="http://schemas.microsoft.com/office/powerpoint/2010/main" xmlns:a14="http://schemas.microsoft.com/office/drawing/2010/main" w="9525">
+                <a14:hiddenLine xmlns:a14="http://schemas.microsoft.com/office/drawing/2010/main" xmlns:p14="http://schemas.microsoft.com/office/powerpoint/2010/main" xmlns:a16="http://schemas.microsoft.com/office/drawing/2014/main" xmlns="" w="9525">
                   <a:solidFill>
                     <a:srgbClr val="000000"/>
                   </a:solidFill>
@@ -13139,7 +13139,7 @@
             </a:ln>
             <a:extLst>
               <a:ext uri="{91240B29-F687-4f45-9708-019B960494DF}">
-                <a14:hiddenLine xmlns="" xmlns:a16="http://schemas.microsoft.com/office/drawing/2014/main" xmlns:p14="http://schemas.microsoft.com/office/powerpoint/2010/main" xmlns:a14="http://schemas.microsoft.com/office/drawing/2010/main" w="9525">
+                <a14:hiddenLine xmlns:a14="http://schemas.microsoft.com/office/drawing/2010/main" xmlns:p14="http://schemas.microsoft.com/office/powerpoint/2010/main" xmlns:a16="http://schemas.microsoft.com/office/drawing/2014/main" xmlns="" w="9525">
                   <a:solidFill>
                     <a:srgbClr val="000000"/>
                   </a:solidFill>
@@ -13216,7 +13216,7 @@
             </a:ln>
             <a:extLst>
               <a:ext uri="{91240B29-F687-4f45-9708-019B960494DF}">
-                <a14:hiddenLine xmlns="" xmlns:a16="http://schemas.microsoft.com/office/drawing/2014/main" xmlns:p14="http://schemas.microsoft.com/office/powerpoint/2010/main" xmlns:a14="http://schemas.microsoft.com/office/drawing/2010/main" w="9525">
+                <a14:hiddenLine xmlns:a14="http://schemas.microsoft.com/office/drawing/2010/main" xmlns:p14="http://schemas.microsoft.com/office/powerpoint/2010/main" xmlns:a16="http://schemas.microsoft.com/office/drawing/2014/main" xmlns="" w="9525">
                   <a:solidFill>
                     <a:srgbClr val="000000"/>
                   </a:solidFill>
@@ -13321,7 +13321,7 @@
             </a:ln>
             <a:extLst>
               <a:ext uri="{91240B29-F687-4f45-9708-019B960494DF}">
-                <a14:hiddenLine xmlns="" xmlns:a16="http://schemas.microsoft.com/office/drawing/2014/main" xmlns:p14="http://schemas.microsoft.com/office/powerpoint/2010/main" xmlns:a14="http://schemas.microsoft.com/office/drawing/2010/main" w="9525">
+                <a14:hiddenLine xmlns:a14="http://schemas.microsoft.com/office/drawing/2010/main" xmlns:p14="http://schemas.microsoft.com/office/powerpoint/2010/main" xmlns:a16="http://schemas.microsoft.com/office/drawing/2014/main" xmlns="" w="9525">
                   <a:solidFill>
                     <a:srgbClr val="000000"/>
                   </a:solidFill>
@@ -13426,7 +13426,7 @@
             </a:ln>
             <a:extLst>
               <a:ext uri="{91240B29-F687-4f45-9708-019B960494DF}">
-                <a14:hiddenLine xmlns="" xmlns:a16="http://schemas.microsoft.com/office/drawing/2014/main" xmlns:p14="http://schemas.microsoft.com/office/powerpoint/2010/main" xmlns:a14="http://schemas.microsoft.com/office/drawing/2010/main" w="9525">
+                <a14:hiddenLine xmlns:a14="http://schemas.microsoft.com/office/drawing/2010/main" xmlns:p14="http://schemas.microsoft.com/office/powerpoint/2010/main" xmlns:a16="http://schemas.microsoft.com/office/drawing/2014/main" xmlns="" w="9525">
                   <a:solidFill>
                     <a:srgbClr val="000000"/>
                   </a:solidFill>
@@ -13503,7 +13503,7 @@
             </a:ln>
             <a:extLst>
               <a:ext uri="{91240B29-F687-4f45-9708-019B960494DF}">
-                <a14:hiddenLine xmlns="" xmlns:a16="http://schemas.microsoft.com/office/drawing/2014/main" xmlns:p14="http://schemas.microsoft.com/office/powerpoint/2010/main" xmlns:a14="http://schemas.microsoft.com/office/drawing/2010/main" w="9525">
+                <a14:hiddenLine xmlns:a14="http://schemas.microsoft.com/office/drawing/2010/main" xmlns:p14="http://schemas.microsoft.com/office/powerpoint/2010/main" xmlns:a16="http://schemas.microsoft.com/office/drawing/2014/main" xmlns="" w="9525">
                   <a:solidFill>
                     <a:srgbClr val="000000"/>
                   </a:solidFill>
@@ -13628,7 +13628,7 @@
             </a:ln>
             <a:extLst>
               <a:ext uri="{91240B29-F687-4f45-9708-019B960494DF}">
-                <a14:hiddenLine xmlns="" xmlns:a16="http://schemas.microsoft.com/office/drawing/2014/main" xmlns:p14="http://schemas.microsoft.com/office/powerpoint/2010/main" xmlns:a14="http://schemas.microsoft.com/office/drawing/2010/main" w="9525">
+                <a14:hiddenLine xmlns:a14="http://schemas.microsoft.com/office/drawing/2010/main" xmlns:p14="http://schemas.microsoft.com/office/powerpoint/2010/main" xmlns:a16="http://schemas.microsoft.com/office/drawing/2014/main" xmlns="" w="9525">
                   <a:solidFill>
                     <a:srgbClr val="000000"/>
                   </a:solidFill>
@@ -13742,7 +13742,7 @@
             </a:ln>
             <a:extLst>
               <a:ext uri="{91240B29-F687-4f45-9708-019B960494DF}">
-                <a14:hiddenLine xmlns="" xmlns:a16="http://schemas.microsoft.com/office/drawing/2014/main" xmlns:p14="http://schemas.microsoft.com/office/powerpoint/2010/main" xmlns:a14="http://schemas.microsoft.com/office/drawing/2010/main" w="9525">
+                <a14:hiddenLine xmlns:a14="http://schemas.microsoft.com/office/drawing/2010/main" xmlns:p14="http://schemas.microsoft.com/office/powerpoint/2010/main" xmlns:a16="http://schemas.microsoft.com/office/drawing/2014/main" xmlns="" w="9525">
                   <a:solidFill>
                     <a:srgbClr val="000000"/>
                   </a:solidFill>
@@ -13819,7 +13819,7 @@
             </a:ln>
             <a:extLst>
               <a:ext uri="{91240B29-F687-4f45-9708-019B960494DF}">
-                <a14:hiddenLine xmlns="" xmlns:a16="http://schemas.microsoft.com/office/drawing/2014/main" xmlns:p14="http://schemas.microsoft.com/office/powerpoint/2010/main" xmlns:a14="http://schemas.microsoft.com/office/drawing/2010/main" w="9525">
+                <a14:hiddenLine xmlns:a14="http://schemas.microsoft.com/office/drawing/2010/main" xmlns:p14="http://schemas.microsoft.com/office/powerpoint/2010/main" xmlns:a16="http://schemas.microsoft.com/office/drawing/2014/main" xmlns="" w="9525">
                   <a:solidFill>
                     <a:srgbClr val="000000"/>
                   </a:solidFill>
@@ -13896,7 +13896,7 @@
             </a:ln>
             <a:extLst>
               <a:ext uri="{91240B29-F687-4f45-9708-019B960494DF}">
-                <a14:hiddenLine xmlns="" xmlns:a16="http://schemas.microsoft.com/office/drawing/2014/main" xmlns:p14="http://schemas.microsoft.com/office/powerpoint/2010/main" xmlns:a14="http://schemas.microsoft.com/office/drawing/2010/main" w="9525">
+                <a14:hiddenLine xmlns:a14="http://schemas.microsoft.com/office/drawing/2010/main" xmlns:p14="http://schemas.microsoft.com/office/powerpoint/2010/main" xmlns:a16="http://schemas.microsoft.com/office/drawing/2014/main" xmlns="" w="9525">
                   <a:solidFill>
                     <a:srgbClr val="000000"/>
                   </a:solidFill>
@@ -14001,7 +14001,7 @@
             </a:ln>
             <a:extLst>
               <a:ext uri="{91240B29-F687-4f45-9708-019B960494DF}">
-                <a14:hiddenLine xmlns="" xmlns:a16="http://schemas.microsoft.com/office/drawing/2014/main" xmlns:p14="http://schemas.microsoft.com/office/powerpoint/2010/main" xmlns:a14="http://schemas.microsoft.com/office/drawing/2010/main" w="9525">
+                <a14:hiddenLine xmlns:a14="http://schemas.microsoft.com/office/drawing/2010/main" xmlns:p14="http://schemas.microsoft.com/office/powerpoint/2010/main" xmlns:a16="http://schemas.microsoft.com/office/drawing/2014/main" xmlns="" w="9525">
                   <a:solidFill>
                     <a:srgbClr val="000000"/>
                   </a:solidFill>
@@ -14050,7 +14050,7 @@
             </a:ln>
             <a:extLst>
               <a:ext uri="{91240B29-F687-4f45-9708-019B960494DF}">
-                <a14:hiddenLine xmlns="" xmlns:a16="http://schemas.microsoft.com/office/drawing/2014/main" xmlns:p14="http://schemas.microsoft.com/office/powerpoint/2010/main" xmlns:a14="http://schemas.microsoft.com/office/drawing/2010/main" w="9525">
+                <a14:hiddenLine xmlns:a14="http://schemas.microsoft.com/office/drawing/2010/main" xmlns:p14="http://schemas.microsoft.com/office/powerpoint/2010/main" xmlns:a16="http://schemas.microsoft.com/office/drawing/2014/main" xmlns="" w="9525">
                   <a:solidFill>
                     <a:srgbClr val="000000"/>
                   </a:solidFill>
@@ -14130,7 +14130,7 @@
             </a:ln>
             <a:extLst>
               <a:ext uri="{91240B29-F687-4f45-9708-019B960494DF}">
-                <a14:hiddenLine xmlns="" xmlns:a16="http://schemas.microsoft.com/office/drawing/2014/main" xmlns:p14="http://schemas.microsoft.com/office/powerpoint/2010/main" xmlns:a14="http://schemas.microsoft.com/office/drawing/2010/main" w="9525">
+                <a14:hiddenLine xmlns:a14="http://schemas.microsoft.com/office/drawing/2010/main" xmlns:p14="http://schemas.microsoft.com/office/powerpoint/2010/main" xmlns:a16="http://schemas.microsoft.com/office/drawing/2014/main" xmlns="" w="9525">
                   <a:solidFill>
                     <a:srgbClr val="000000"/>
                   </a:solidFill>
@@ -14235,7 +14235,7 @@
             </a:ln>
             <a:extLst>
               <a:ext uri="{91240B29-F687-4f45-9708-019B960494DF}">
-                <a14:hiddenLine xmlns="" xmlns:a16="http://schemas.microsoft.com/office/drawing/2014/main" xmlns:p14="http://schemas.microsoft.com/office/powerpoint/2010/main" xmlns:a14="http://schemas.microsoft.com/office/drawing/2010/main" w="9525">
+                <a14:hiddenLine xmlns:a14="http://schemas.microsoft.com/office/drawing/2010/main" xmlns:p14="http://schemas.microsoft.com/office/powerpoint/2010/main" xmlns:a16="http://schemas.microsoft.com/office/drawing/2014/main" xmlns="" w="9525">
                   <a:solidFill>
                     <a:srgbClr val="000000"/>
                   </a:solidFill>
@@ -14312,7 +14312,7 @@
             </a:ln>
             <a:extLst>
               <a:ext uri="{91240B29-F687-4f45-9708-019B960494DF}">
-                <a14:hiddenLine xmlns="" xmlns:a16="http://schemas.microsoft.com/office/drawing/2014/main" xmlns:p14="http://schemas.microsoft.com/office/powerpoint/2010/main" xmlns:a14="http://schemas.microsoft.com/office/drawing/2010/main" w="9525">
+                <a14:hiddenLine xmlns:a14="http://schemas.microsoft.com/office/drawing/2010/main" xmlns:p14="http://schemas.microsoft.com/office/powerpoint/2010/main" xmlns:a16="http://schemas.microsoft.com/office/drawing/2014/main" xmlns="" w="9525">
                   <a:solidFill>
                     <a:srgbClr val="000000"/>
                   </a:solidFill>
@@ -14417,7 +14417,7 @@
             </a:ln>
             <a:extLst>
               <a:ext uri="{91240B29-F687-4f45-9708-019B960494DF}">
-                <a14:hiddenLine xmlns="" xmlns:a16="http://schemas.microsoft.com/office/drawing/2014/main" xmlns:p14="http://schemas.microsoft.com/office/powerpoint/2010/main" xmlns:a14="http://schemas.microsoft.com/office/drawing/2010/main" w="9525">
+                <a14:hiddenLine xmlns:a14="http://schemas.microsoft.com/office/drawing/2010/main" xmlns:p14="http://schemas.microsoft.com/office/powerpoint/2010/main" xmlns:a16="http://schemas.microsoft.com/office/drawing/2014/main" xmlns="" w="9525">
                   <a:solidFill>
                     <a:srgbClr val="000000"/>
                   </a:solidFill>
@@ -14497,7 +14497,7 @@
             </a:ln>
             <a:extLst>
               <a:ext uri="{91240B29-F687-4f45-9708-019B960494DF}">
-                <a14:hiddenLine xmlns="" xmlns:a16="http://schemas.microsoft.com/office/drawing/2014/main" xmlns:p14="http://schemas.microsoft.com/office/powerpoint/2010/main" xmlns:a14="http://schemas.microsoft.com/office/drawing/2010/main" w="9525">
+                <a14:hiddenLine xmlns:a14="http://schemas.microsoft.com/office/drawing/2010/main" xmlns:p14="http://schemas.microsoft.com/office/powerpoint/2010/main" xmlns:a16="http://schemas.microsoft.com/office/drawing/2014/main" xmlns="" w="9525">
                   <a:solidFill>
                     <a:srgbClr val="000000"/>
                   </a:solidFill>
@@ -14574,7 +14574,7 @@
             </a:ln>
             <a:extLst>
               <a:ext uri="{91240B29-F687-4f45-9708-019B960494DF}">
-                <a14:hiddenLine xmlns="" xmlns:a16="http://schemas.microsoft.com/office/drawing/2014/main" xmlns:p14="http://schemas.microsoft.com/office/powerpoint/2010/main" xmlns:a14="http://schemas.microsoft.com/office/drawing/2010/main" w="9525">
+                <a14:hiddenLine xmlns:a14="http://schemas.microsoft.com/office/drawing/2010/main" xmlns:p14="http://schemas.microsoft.com/office/powerpoint/2010/main" xmlns:a16="http://schemas.microsoft.com/office/drawing/2014/main" xmlns="" w="9525">
                   <a:solidFill>
                     <a:srgbClr val="000000"/>
                   </a:solidFill>
@@ -14679,7 +14679,7 @@
             </a:ln>
             <a:extLst>
               <a:ext uri="{91240B29-F687-4f45-9708-019B960494DF}">
-                <a14:hiddenLine xmlns="" xmlns:a16="http://schemas.microsoft.com/office/drawing/2014/main" xmlns:p14="http://schemas.microsoft.com/office/powerpoint/2010/main" xmlns:a14="http://schemas.microsoft.com/office/drawing/2010/main" w="9525">
+                <a14:hiddenLine xmlns:a14="http://schemas.microsoft.com/office/drawing/2010/main" xmlns:p14="http://schemas.microsoft.com/office/powerpoint/2010/main" xmlns:a16="http://schemas.microsoft.com/office/drawing/2014/main" xmlns="" w="9525">
                   <a:solidFill>
                     <a:srgbClr val="000000"/>
                   </a:solidFill>
@@ -14784,7 +14784,7 @@
             </a:ln>
             <a:extLst>
               <a:ext uri="{91240B29-F687-4f45-9708-019B960494DF}">
-                <a14:hiddenLine xmlns="" xmlns:a16="http://schemas.microsoft.com/office/drawing/2014/main" xmlns:p14="http://schemas.microsoft.com/office/powerpoint/2010/main" xmlns:a14="http://schemas.microsoft.com/office/drawing/2010/main" w="9525">
+                <a14:hiddenLine xmlns:a14="http://schemas.microsoft.com/office/drawing/2010/main" xmlns:p14="http://schemas.microsoft.com/office/powerpoint/2010/main" xmlns:a16="http://schemas.microsoft.com/office/drawing/2014/main" xmlns="" w="9525">
                   <a:solidFill>
                     <a:srgbClr val="000000"/>
                   </a:solidFill>
@@ -14864,7 +14864,7 @@
             </a:ln>
             <a:extLst>
               <a:ext uri="{91240B29-F687-4f45-9708-019B960494DF}">
-                <a14:hiddenLine xmlns="" xmlns:a16="http://schemas.microsoft.com/office/drawing/2014/main" xmlns:p14="http://schemas.microsoft.com/office/powerpoint/2010/main" xmlns:a14="http://schemas.microsoft.com/office/drawing/2010/main" w="9525">
+                <a14:hiddenLine xmlns:a14="http://schemas.microsoft.com/office/drawing/2010/main" xmlns:p14="http://schemas.microsoft.com/office/powerpoint/2010/main" xmlns:a16="http://schemas.microsoft.com/office/drawing/2014/main" xmlns="" w="9525">
                   <a:solidFill>
                     <a:srgbClr val="000000"/>
                   </a:solidFill>
@@ -14999,7 +14999,7 @@
             </a:ln>
             <a:extLst>
               <a:ext uri="{91240B29-F687-4f45-9708-019B960494DF}">
-                <a14:hiddenLine xmlns="" xmlns:a16="http://schemas.microsoft.com/office/drawing/2014/main" xmlns:p14="http://schemas.microsoft.com/office/powerpoint/2010/main" xmlns:a14="http://schemas.microsoft.com/office/drawing/2010/main" w="9525">
+                <a14:hiddenLine xmlns:a14="http://schemas.microsoft.com/office/drawing/2010/main" xmlns:p14="http://schemas.microsoft.com/office/powerpoint/2010/main" xmlns:a16="http://schemas.microsoft.com/office/drawing/2014/main" xmlns="" w="9525">
                   <a:solidFill>
                     <a:srgbClr val="000000"/>
                   </a:solidFill>
@@ -15150,11 +15150,11 @@
           <a:p>
             <a:r>
               <a:rPr lang="en-US" dirty="0"/>
-              <a:t>Even though model has 81% accuracy, the f1 score is 0.3. Model predicts a lot of false negatives which may result in loss of business </a:t>
+              <a:t>Even though model has 81% accuracy, the f1 score is 0.3. Model predicts a lot of false negatives which may result in loss of </a:t>
             </a:r>
             <a:r>
-              <a:rPr lang="en-US" dirty="0" err="1"/>
-              <a:t>oppotunity</a:t>
+              <a:rPr lang="en-US"/>
+              <a:t>business opportunity</a:t>
             </a:r>
             <a:endParaRPr lang="en-US" dirty="0"/>
           </a:p>
@@ -15339,7 +15339,7 @@
             </a:ln>
             <a:extLst>
               <a:ext uri="{91240B29-F687-4f45-9708-019B960494DF}">
-                <a14:hiddenLine xmlns="" xmlns:a16="http://schemas.microsoft.com/office/drawing/2014/main" xmlns:p14="http://schemas.microsoft.com/office/powerpoint/2010/main" xmlns:a14="http://schemas.microsoft.com/office/drawing/2010/main" w="9525">
+                <a14:hiddenLine xmlns:a14="http://schemas.microsoft.com/office/drawing/2010/main" xmlns:p14="http://schemas.microsoft.com/office/powerpoint/2010/main" xmlns:a16="http://schemas.microsoft.com/office/drawing/2014/main" xmlns="" w="9525">
                   <a:solidFill>
                     <a:srgbClr val="000000"/>
                   </a:solidFill>
@@ -15444,7 +15444,7 @@
             </a:ln>
             <a:extLst>
               <a:ext uri="{91240B29-F687-4f45-9708-019B960494DF}">
-                <a14:hiddenLine xmlns="" xmlns:a16="http://schemas.microsoft.com/office/drawing/2014/main" xmlns:p14="http://schemas.microsoft.com/office/powerpoint/2010/main" xmlns:a14="http://schemas.microsoft.com/office/drawing/2010/main" w="9525">
+                <a14:hiddenLine xmlns:a14="http://schemas.microsoft.com/office/drawing/2010/main" xmlns:p14="http://schemas.microsoft.com/office/powerpoint/2010/main" xmlns:a16="http://schemas.microsoft.com/office/drawing/2014/main" xmlns="" w="9525">
                   <a:solidFill>
                     <a:srgbClr val="000000"/>
                   </a:solidFill>
@@ -15549,7 +15549,7 @@
             </a:ln>
             <a:extLst>
               <a:ext uri="{91240B29-F687-4f45-9708-019B960494DF}">
-                <a14:hiddenLine xmlns="" xmlns:a16="http://schemas.microsoft.com/office/drawing/2014/main" xmlns:p14="http://schemas.microsoft.com/office/powerpoint/2010/main" xmlns:a14="http://schemas.microsoft.com/office/drawing/2010/main" w="9525">
+                <a14:hiddenLine xmlns:a14="http://schemas.microsoft.com/office/drawing/2010/main" xmlns:p14="http://schemas.microsoft.com/office/powerpoint/2010/main" xmlns:a16="http://schemas.microsoft.com/office/drawing/2014/main" xmlns="" w="9525">
                   <a:solidFill>
                     <a:srgbClr val="000000"/>
                   </a:solidFill>
@@ -15626,7 +15626,7 @@
             </a:ln>
             <a:extLst>
               <a:ext uri="{91240B29-F687-4f45-9708-019B960494DF}">
-                <a14:hiddenLine xmlns="" xmlns:a16="http://schemas.microsoft.com/office/drawing/2014/main" xmlns:p14="http://schemas.microsoft.com/office/powerpoint/2010/main" xmlns:a14="http://schemas.microsoft.com/office/drawing/2010/main" w="9525">
+                <a14:hiddenLine xmlns:a14="http://schemas.microsoft.com/office/drawing/2010/main" xmlns:p14="http://schemas.microsoft.com/office/powerpoint/2010/main" xmlns:a16="http://schemas.microsoft.com/office/drawing/2014/main" xmlns="" w="9525">
                   <a:solidFill>
                     <a:srgbClr val="000000"/>
                   </a:solidFill>
@@ -15731,7 +15731,7 @@
             </a:ln>
             <a:extLst>
               <a:ext uri="{91240B29-F687-4f45-9708-019B960494DF}">
-                <a14:hiddenLine xmlns="" xmlns:a16="http://schemas.microsoft.com/office/drawing/2014/main" xmlns:p14="http://schemas.microsoft.com/office/powerpoint/2010/main" xmlns:a14="http://schemas.microsoft.com/office/drawing/2010/main" w="9525">
+                <a14:hiddenLine xmlns:a14="http://schemas.microsoft.com/office/drawing/2010/main" xmlns:p14="http://schemas.microsoft.com/office/powerpoint/2010/main" xmlns:a16="http://schemas.microsoft.com/office/drawing/2014/main" xmlns="" w="9525">
                   <a:solidFill>
                     <a:srgbClr val="000000"/>
                   </a:solidFill>
@@ -15808,7 +15808,7 @@
             </a:ln>
             <a:extLst>
               <a:ext uri="{91240B29-F687-4f45-9708-019B960494DF}">
-                <a14:hiddenLine xmlns="" xmlns:a16="http://schemas.microsoft.com/office/drawing/2014/main" xmlns:p14="http://schemas.microsoft.com/office/powerpoint/2010/main" xmlns:a14="http://schemas.microsoft.com/office/drawing/2010/main" w="9525">
+                <a14:hiddenLine xmlns:a14="http://schemas.microsoft.com/office/drawing/2010/main" xmlns:p14="http://schemas.microsoft.com/office/powerpoint/2010/main" xmlns:a16="http://schemas.microsoft.com/office/drawing/2014/main" xmlns="" w="9525">
                   <a:solidFill>
                     <a:srgbClr val="000000"/>
                   </a:solidFill>
@@ -15885,7 +15885,7 @@
             </a:ln>
             <a:extLst>
               <a:ext uri="{91240B29-F687-4f45-9708-019B960494DF}">
-                <a14:hiddenLine xmlns="" xmlns:a16="http://schemas.microsoft.com/office/drawing/2014/main" xmlns:p14="http://schemas.microsoft.com/office/powerpoint/2010/main" xmlns:a14="http://schemas.microsoft.com/office/drawing/2010/main" w="9525">
+                <a14:hiddenLine xmlns:a14="http://schemas.microsoft.com/office/drawing/2010/main" xmlns:p14="http://schemas.microsoft.com/office/powerpoint/2010/main" xmlns:a16="http://schemas.microsoft.com/office/drawing/2014/main" xmlns="" w="9525">
                   <a:solidFill>
                     <a:srgbClr val="000000"/>
                   </a:solidFill>
@@ -15990,7 +15990,7 @@
             </a:ln>
             <a:extLst>
               <a:ext uri="{91240B29-F687-4f45-9708-019B960494DF}">
-                <a14:hiddenLine xmlns="" xmlns:a16="http://schemas.microsoft.com/office/drawing/2014/main" xmlns:p14="http://schemas.microsoft.com/office/powerpoint/2010/main" xmlns:a14="http://schemas.microsoft.com/office/drawing/2010/main" w="9525">
+                <a14:hiddenLine xmlns:a14="http://schemas.microsoft.com/office/drawing/2010/main" xmlns:p14="http://schemas.microsoft.com/office/powerpoint/2010/main" xmlns:a16="http://schemas.microsoft.com/office/drawing/2014/main" xmlns="" w="9525">
                   <a:solidFill>
                     <a:srgbClr val="000000"/>
                   </a:solidFill>
@@ -16095,7 +16095,7 @@
             </a:ln>
             <a:extLst>
               <a:ext uri="{91240B29-F687-4f45-9708-019B960494DF}">
-                <a14:hiddenLine xmlns="" xmlns:a16="http://schemas.microsoft.com/office/drawing/2014/main" xmlns:p14="http://schemas.microsoft.com/office/powerpoint/2010/main" xmlns:a14="http://schemas.microsoft.com/office/drawing/2010/main" w="9525">
+                <a14:hiddenLine xmlns:a14="http://schemas.microsoft.com/office/drawing/2010/main" xmlns:p14="http://schemas.microsoft.com/office/powerpoint/2010/main" xmlns:a16="http://schemas.microsoft.com/office/drawing/2014/main" xmlns="" w="9525">
                   <a:solidFill>
                     <a:srgbClr val="000000"/>
                   </a:solidFill>
@@ -16172,7 +16172,7 @@
             </a:ln>
             <a:extLst>
               <a:ext uri="{91240B29-F687-4f45-9708-019B960494DF}">
-                <a14:hiddenLine xmlns="" xmlns:a16="http://schemas.microsoft.com/office/drawing/2014/main" xmlns:p14="http://schemas.microsoft.com/office/powerpoint/2010/main" xmlns:a14="http://schemas.microsoft.com/office/drawing/2010/main" w="9525">
+                <a14:hiddenLine xmlns:a14="http://schemas.microsoft.com/office/drawing/2010/main" xmlns:p14="http://schemas.microsoft.com/office/powerpoint/2010/main" xmlns:a16="http://schemas.microsoft.com/office/drawing/2014/main" xmlns="" w="9525">
                   <a:solidFill>
                     <a:srgbClr val="000000"/>
                   </a:solidFill>
@@ -16297,7 +16297,7 @@
             </a:ln>
             <a:extLst>
               <a:ext uri="{91240B29-F687-4f45-9708-019B960494DF}">
-                <a14:hiddenLine xmlns="" xmlns:a16="http://schemas.microsoft.com/office/drawing/2014/main" xmlns:p14="http://schemas.microsoft.com/office/powerpoint/2010/main" xmlns:a14="http://schemas.microsoft.com/office/drawing/2010/main" w="9525">
+                <a14:hiddenLine xmlns:a14="http://schemas.microsoft.com/office/drawing/2010/main" xmlns:p14="http://schemas.microsoft.com/office/powerpoint/2010/main" xmlns:a16="http://schemas.microsoft.com/office/drawing/2014/main" xmlns="" w="9525">
                   <a:solidFill>
                     <a:srgbClr val="000000"/>
                   </a:solidFill>
@@ -16411,7 +16411,7 @@
             </a:ln>
             <a:extLst>
               <a:ext uri="{91240B29-F687-4f45-9708-019B960494DF}">
-                <a14:hiddenLine xmlns="" xmlns:a16="http://schemas.microsoft.com/office/drawing/2014/main" xmlns:p14="http://schemas.microsoft.com/office/powerpoint/2010/main" xmlns:a14="http://schemas.microsoft.com/office/drawing/2010/main" w="9525">
+                <a14:hiddenLine xmlns:a14="http://schemas.microsoft.com/office/drawing/2010/main" xmlns:p14="http://schemas.microsoft.com/office/powerpoint/2010/main" xmlns:a16="http://schemas.microsoft.com/office/drawing/2014/main" xmlns="" w="9525">
                   <a:solidFill>
                     <a:srgbClr val="000000"/>
                   </a:solidFill>
@@ -16488,7 +16488,7 @@
             </a:ln>
             <a:extLst>
               <a:ext uri="{91240B29-F687-4f45-9708-019B960494DF}">
-                <a14:hiddenLine xmlns="" xmlns:a16="http://schemas.microsoft.com/office/drawing/2014/main" xmlns:p14="http://schemas.microsoft.com/office/powerpoint/2010/main" xmlns:a14="http://schemas.microsoft.com/office/drawing/2010/main" w="9525">
+                <a14:hiddenLine xmlns:a14="http://schemas.microsoft.com/office/drawing/2010/main" xmlns:p14="http://schemas.microsoft.com/office/powerpoint/2010/main" xmlns:a16="http://schemas.microsoft.com/office/drawing/2014/main" xmlns="" w="9525">
                   <a:solidFill>
                     <a:srgbClr val="000000"/>
                   </a:solidFill>
@@ -16565,7 +16565,7 @@
             </a:ln>
             <a:extLst>
               <a:ext uri="{91240B29-F687-4f45-9708-019B960494DF}">
-                <a14:hiddenLine xmlns="" xmlns:a16="http://schemas.microsoft.com/office/drawing/2014/main" xmlns:p14="http://schemas.microsoft.com/office/powerpoint/2010/main" xmlns:a14="http://schemas.microsoft.com/office/drawing/2010/main" w="9525">
+                <a14:hiddenLine xmlns:a14="http://schemas.microsoft.com/office/drawing/2010/main" xmlns:p14="http://schemas.microsoft.com/office/powerpoint/2010/main" xmlns:a16="http://schemas.microsoft.com/office/drawing/2014/main" xmlns="" w="9525">
                   <a:solidFill>
                     <a:srgbClr val="000000"/>
                   </a:solidFill>
@@ -16670,7 +16670,7 @@
             </a:ln>
             <a:extLst>
               <a:ext uri="{91240B29-F687-4f45-9708-019B960494DF}">
-                <a14:hiddenLine xmlns="" xmlns:a16="http://schemas.microsoft.com/office/drawing/2014/main" xmlns:p14="http://schemas.microsoft.com/office/powerpoint/2010/main" xmlns:a14="http://schemas.microsoft.com/office/drawing/2010/main" w="9525">
+                <a14:hiddenLine xmlns:a14="http://schemas.microsoft.com/office/drawing/2010/main" xmlns:p14="http://schemas.microsoft.com/office/powerpoint/2010/main" xmlns:a16="http://schemas.microsoft.com/office/drawing/2014/main" xmlns="" w="9525">
                   <a:solidFill>
                     <a:srgbClr val="000000"/>
                   </a:solidFill>
@@ -16719,7 +16719,7 @@
             </a:ln>
             <a:extLst>
               <a:ext uri="{91240B29-F687-4f45-9708-019B960494DF}">
-                <a14:hiddenLine xmlns="" xmlns:a16="http://schemas.microsoft.com/office/drawing/2014/main" xmlns:p14="http://schemas.microsoft.com/office/powerpoint/2010/main" xmlns:a14="http://schemas.microsoft.com/office/drawing/2010/main" w="9525">
+                <a14:hiddenLine xmlns:a14="http://schemas.microsoft.com/office/drawing/2010/main" xmlns:p14="http://schemas.microsoft.com/office/powerpoint/2010/main" xmlns:a16="http://schemas.microsoft.com/office/drawing/2014/main" xmlns="" w="9525">
                   <a:solidFill>
                     <a:srgbClr val="000000"/>
                   </a:solidFill>
@@ -16799,7 +16799,7 @@
             </a:ln>
             <a:extLst>
               <a:ext uri="{91240B29-F687-4f45-9708-019B960494DF}">
-                <a14:hiddenLine xmlns="" xmlns:a16="http://schemas.microsoft.com/office/drawing/2014/main" xmlns:p14="http://schemas.microsoft.com/office/powerpoint/2010/main" xmlns:a14="http://schemas.microsoft.com/office/drawing/2010/main" w="9525">
+                <a14:hiddenLine xmlns:a14="http://schemas.microsoft.com/office/drawing/2010/main" xmlns:p14="http://schemas.microsoft.com/office/powerpoint/2010/main" xmlns:a16="http://schemas.microsoft.com/office/drawing/2014/main" xmlns="" w="9525">
                   <a:solidFill>
                     <a:srgbClr val="000000"/>
                   </a:solidFill>
@@ -16904,7 +16904,7 @@
             </a:ln>
             <a:extLst>
               <a:ext uri="{91240B29-F687-4f45-9708-019B960494DF}">
-                <a14:hiddenLine xmlns="" xmlns:a16="http://schemas.microsoft.com/office/drawing/2014/main" xmlns:p14="http://schemas.microsoft.com/office/powerpoint/2010/main" xmlns:a14="http://schemas.microsoft.com/office/drawing/2010/main" w="9525">
+                <a14:hiddenLine xmlns:a14="http://schemas.microsoft.com/office/drawing/2010/main" xmlns:p14="http://schemas.microsoft.com/office/powerpoint/2010/main" xmlns:a16="http://schemas.microsoft.com/office/drawing/2014/main" xmlns="" w="9525">
                   <a:solidFill>
                     <a:srgbClr val="000000"/>
                   </a:solidFill>
@@ -16981,7 +16981,7 @@
             </a:ln>
             <a:extLst>
               <a:ext uri="{91240B29-F687-4f45-9708-019B960494DF}">
-                <a14:hiddenLine xmlns="" xmlns:a16="http://schemas.microsoft.com/office/drawing/2014/main" xmlns:p14="http://schemas.microsoft.com/office/powerpoint/2010/main" xmlns:a14="http://schemas.microsoft.com/office/drawing/2010/main" w="9525">
+                <a14:hiddenLine xmlns:a14="http://schemas.microsoft.com/office/drawing/2010/main" xmlns:p14="http://schemas.microsoft.com/office/powerpoint/2010/main" xmlns:a16="http://schemas.microsoft.com/office/drawing/2014/main" xmlns="" w="9525">
                   <a:solidFill>
                     <a:srgbClr val="000000"/>
                   </a:solidFill>
@@ -17086,7 +17086,7 @@
             </a:ln>
             <a:extLst>
               <a:ext uri="{91240B29-F687-4f45-9708-019B960494DF}">
-                <a14:hiddenLine xmlns="" xmlns:a16="http://schemas.microsoft.com/office/drawing/2014/main" xmlns:p14="http://schemas.microsoft.com/office/powerpoint/2010/main" xmlns:a14="http://schemas.microsoft.com/office/drawing/2010/main" w="9525">
+                <a14:hiddenLine xmlns:a14="http://schemas.microsoft.com/office/drawing/2010/main" xmlns:p14="http://schemas.microsoft.com/office/powerpoint/2010/main" xmlns:a16="http://schemas.microsoft.com/office/drawing/2014/main" xmlns="" w="9525">
                   <a:solidFill>
                     <a:srgbClr val="000000"/>
                   </a:solidFill>
@@ -17166,7 +17166,7 @@
             </a:ln>
             <a:extLst>
               <a:ext uri="{91240B29-F687-4f45-9708-019B960494DF}">
-                <a14:hiddenLine xmlns="" xmlns:a16="http://schemas.microsoft.com/office/drawing/2014/main" xmlns:p14="http://schemas.microsoft.com/office/powerpoint/2010/main" xmlns:a14="http://schemas.microsoft.com/office/drawing/2010/main" w="9525">
+                <a14:hiddenLine xmlns:a14="http://schemas.microsoft.com/office/drawing/2010/main" xmlns:p14="http://schemas.microsoft.com/office/powerpoint/2010/main" xmlns:a16="http://schemas.microsoft.com/office/drawing/2014/main" xmlns="" w="9525">
                   <a:solidFill>
                     <a:srgbClr val="000000"/>
                   </a:solidFill>
@@ -17243,7 +17243,7 @@
             </a:ln>
             <a:extLst>
               <a:ext uri="{91240B29-F687-4f45-9708-019B960494DF}">
-                <a14:hiddenLine xmlns="" xmlns:a16="http://schemas.microsoft.com/office/drawing/2014/main" xmlns:p14="http://schemas.microsoft.com/office/powerpoint/2010/main" xmlns:a14="http://schemas.microsoft.com/office/drawing/2010/main" w="9525">
+                <a14:hiddenLine xmlns:a14="http://schemas.microsoft.com/office/drawing/2010/main" xmlns:p14="http://schemas.microsoft.com/office/powerpoint/2010/main" xmlns:a16="http://schemas.microsoft.com/office/drawing/2014/main" xmlns="" w="9525">
                   <a:solidFill>
                     <a:srgbClr val="000000"/>
                   </a:solidFill>
@@ -17348,7 +17348,7 @@
             </a:ln>
             <a:extLst>
               <a:ext uri="{91240B29-F687-4f45-9708-019B960494DF}">
-                <a14:hiddenLine xmlns="" xmlns:a16="http://schemas.microsoft.com/office/drawing/2014/main" xmlns:p14="http://schemas.microsoft.com/office/powerpoint/2010/main" xmlns:a14="http://schemas.microsoft.com/office/drawing/2010/main" w="9525">
+                <a14:hiddenLine xmlns:a14="http://schemas.microsoft.com/office/drawing/2010/main" xmlns:p14="http://schemas.microsoft.com/office/powerpoint/2010/main" xmlns:a16="http://schemas.microsoft.com/office/drawing/2014/main" xmlns="" w="9525">
                   <a:solidFill>
                     <a:srgbClr val="000000"/>
                   </a:solidFill>
@@ -17453,7 +17453,7 @@
             </a:ln>
             <a:extLst>
               <a:ext uri="{91240B29-F687-4f45-9708-019B960494DF}">
-                <a14:hiddenLine xmlns="" xmlns:a16="http://schemas.microsoft.com/office/drawing/2014/main" xmlns:p14="http://schemas.microsoft.com/office/powerpoint/2010/main" xmlns:a14="http://schemas.microsoft.com/office/drawing/2010/main" w="9525">
+                <a14:hiddenLine xmlns:a14="http://schemas.microsoft.com/office/drawing/2010/main" xmlns:p14="http://schemas.microsoft.com/office/powerpoint/2010/main" xmlns:a16="http://schemas.microsoft.com/office/drawing/2014/main" xmlns="" w="9525">
                   <a:solidFill>
                     <a:srgbClr val="000000"/>
                   </a:solidFill>
@@ -17533,7 +17533,7 @@
             </a:ln>
             <a:extLst>
               <a:ext uri="{91240B29-F687-4f45-9708-019B960494DF}">
-                <a14:hiddenLine xmlns="" xmlns:a16="http://schemas.microsoft.com/office/drawing/2014/main" xmlns:p14="http://schemas.microsoft.com/office/powerpoint/2010/main" xmlns:a14="http://schemas.microsoft.com/office/drawing/2010/main" w="9525">
+                <a14:hiddenLine xmlns:a14="http://schemas.microsoft.com/office/drawing/2010/main" xmlns:p14="http://schemas.microsoft.com/office/powerpoint/2010/main" xmlns:a16="http://schemas.microsoft.com/office/drawing/2014/main" xmlns="" w="9525">
                   <a:solidFill>
                     <a:srgbClr val="000000"/>
                   </a:solidFill>
@@ -17668,7 +17668,7 @@
             </a:ln>
             <a:extLst>
               <a:ext uri="{91240B29-F687-4f45-9708-019B960494DF}">
-                <a14:hiddenLine xmlns="" xmlns:a16="http://schemas.microsoft.com/office/drawing/2014/main" xmlns:p14="http://schemas.microsoft.com/office/powerpoint/2010/main" xmlns:a14="http://schemas.microsoft.com/office/drawing/2010/main" w="9525">
+                <a14:hiddenLine xmlns:a14="http://schemas.microsoft.com/office/drawing/2010/main" xmlns:p14="http://schemas.microsoft.com/office/powerpoint/2010/main" xmlns:a16="http://schemas.microsoft.com/office/drawing/2014/main" xmlns="" w="9525">
                   <a:solidFill>
                     <a:srgbClr val="000000"/>
                   </a:solidFill>
@@ -17809,7 +17809,7 @@
           <a:p>
             <a:r>
               <a:rPr lang="en-US" dirty="0"/>
-              <a:t>Link to code  https://github.com/Satyaki9207/uber-supply-demand-mismatch-analysis</a:t>
+              <a:t>Link to code  https://github.com/Satyaki9207/click_through_rate_prediction</a:t>
             </a:r>
           </a:p>
         </p:txBody>

</xml_diff>